<commit_message>
added level stuff to powerpoint
</commit_message>
<xml_diff>
--- a/Presentation/CSE 471 Project 3.pptx
+++ b/Presentation/CSE 471 Project 3.pptx
@@ -8,6 +8,7 @@
     <p:sldId id="256" r:id="rId2"/>
     <p:sldId id="257" r:id="rId3"/>
     <p:sldId id="258" r:id="rId4"/>
+    <p:sldId id="259" r:id="rId5"/>
   </p:sldIdLst>
   <p:sldSz cx="12192000" cy="6858000"/>
   <p:notesSz cx="6858000" cy="9144000"/>
@@ -106,6 +107,11 @@
       </a:defRPr>
     </a:lvl9pPr>
   </p:defaultTextStyle>
+  <p:extLst>
+    <p:ext uri="{EFAFB233-063F-42B5-8137-9DF3F51BA10A}">
+      <p15:sldGuideLst xmlns:p15="http://schemas.microsoft.com/office/powerpoint/2012/main"/>
+    </p:ext>
+  </p:extLst>
 </p:presentation>
 </file>
 
@@ -295,7 +301,7 @@
           <a:p>
             <a:fld id="{4AAD347D-5ACD-4C99-B74B-A9C85AD731AF}" type="datetimeFigureOut">
               <a:rPr lang="en-US" dirty="0"/>
-              <a:t>5/2/2016</a:t>
+              <a:t>5/3/2016</a:t>
             </a:fld>
             <a:endParaRPr lang="en-US" dirty="0"/>
           </a:p>
@@ -565,7 +571,7 @@
           <a:p>
             <a:fld id="{4509A250-FF31-4206-8172-F9D3106AACB1}" type="datetimeFigureOut">
               <a:rPr lang="en-US" dirty="0"/>
-              <a:t>5/2/2016</a:t>
+              <a:t>5/3/2016</a:t>
             </a:fld>
             <a:endParaRPr lang="en-US" dirty="0"/>
           </a:p>
@@ -754,7 +760,7 @@
           <a:p>
             <a:fld id="{4509A250-FF31-4206-8172-F9D3106AACB1}" type="datetimeFigureOut">
               <a:rPr lang="en-US" dirty="0"/>
-              <a:t>5/2/2016</a:t>
+              <a:t>5/3/2016</a:t>
             </a:fld>
             <a:endParaRPr lang="en-US" dirty="0"/>
           </a:p>
@@ -1022,7 +1028,7 @@
           <a:p>
             <a:fld id="{4509A250-FF31-4206-8172-F9D3106AACB1}" type="datetimeFigureOut">
               <a:rPr lang="en-US" dirty="0"/>
-              <a:t>5/2/2016</a:t>
+              <a:t>5/3/2016</a:t>
             </a:fld>
             <a:endParaRPr lang="en-US" dirty="0"/>
           </a:p>
@@ -1358,7 +1364,7 @@
           <a:p>
             <a:fld id="{4509A250-FF31-4206-8172-F9D3106AACB1}" type="datetimeFigureOut">
               <a:rPr lang="en-US" dirty="0"/>
-              <a:t>5/2/2016</a:t>
+              <a:t>5/3/2016</a:t>
             </a:fld>
             <a:endParaRPr lang="en-US" dirty="0"/>
           </a:p>
@@ -1976,7 +1982,7 @@
           <a:p>
             <a:fld id="{4509A250-FF31-4206-8172-F9D3106AACB1}" type="datetimeFigureOut">
               <a:rPr lang="en-US" dirty="0"/>
-              <a:t>5/2/2016</a:t>
+              <a:t>5/3/2016</a:t>
             </a:fld>
             <a:endParaRPr lang="en-US" dirty="0"/>
           </a:p>
@@ -2831,7 +2837,7 @@
           <a:p>
             <a:fld id="{4509A250-FF31-4206-8172-F9D3106AACB1}" type="datetimeFigureOut">
               <a:rPr lang="en-US" dirty="0"/>
-              <a:t>5/2/2016</a:t>
+              <a:t>5/3/2016</a:t>
             </a:fld>
             <a:endParaRPr lang="en-US" dirty="0"/>
           </a:p>
@@ -2996,7 +3002,7 @@
           <a:p>
             <a:fld id="{4509A250-FF31-4206-8172-F9D3106AACB1}" type="datetimeFigureOut">
               <a:rPr lang="en-US" dirty="0"/>
-              <a:t>5/2/2016</a:t>
+              <a:t>5/3/2016</a:t>
             </a:fld>
             <a:endParaRPr lang="en-US" dirty="0"/>
           </a:p>
@@ -3171,7 +3177,7 @@
           <a:p>
             <a:fld id="{4509A250-FF31-4206-8172-F9D3106AACB1}" type="datetimeFigureOut">
               <a:rPr lang="en-US" dirty="0"/>
-              <a:t>5/2/2016</a:t>
+              <a:t>5/3/2016</a:t>
             </a:fld>
             <a:endParaRPr lang="en-US" dirty="0"/>
           </a:p>
@@ -3336,7 +3342,7 @@
           <a:p>
             <a:fld id="{4509A250-FF31-4206-8172-F9D3106AACB1}" type="datetimeFigureOut">
               <a:rPr lang="en-US" dirty="0"/>
-              <a:t>5/2/2016</a:t>
+              <a:t>5/3/2016</a:t>
             </a:fld>
             <a:endParaRPr lang="en-US" dirty="0"/>
           </a:p>
@@ -3578,7 +3584,7 @@
           <a:p>
             <a:fld id="{9796027F-7875-4030-9381-8BD8C4F21935}" type="datetimeFigureOut">
               <a:rPr lang="en-US" dirty="0"/>
-              <a:t>5/2/2016</a:t>
+              <a:t>5/3/2016</a:t>
             </a:fld>
             <a:endParaRPr lang="en-US" dirty="0"/>
           </a:p>
@@ -3865,7 +3871,7 @@
           <a:p>
             <a:fld id="{9796027F-7875-4030-9381-8BD8C4F21935}" type="datetimeFigureOut">
               <a:rPr lang="en-US" dirty="0"/>
-              <a:t>5/2/2016</a:t>
+              <a:t>5/3/2016</a:t>
             </a:fld>
             <a:endParaRPr lang="en-US" dirty="0"/>
           </a:p>
@@ -4304,7 +4310,7 @@
           <a:p>
             <a:fld id="{9796027F-7875-4030-9381-8BD8C4F21935}" type="datetimeFigureOut">
               <a:rPr lang="en-US" dirty="0"/>
-              <a:t>5/2/2016</a:t>
+              <a:t>5/3/2016</a:t>
             </a:fld>
             <a:endParaRPr lang="en-US" dirty="0"/>
           </a:p>
@@ -4417,7 +4423,7 @@
           <a:p>
             <a:fld id="{4509A250-FF31-4206-8172-F9D3106AACB1}" type="datetimeFigureOut">
               <a:rPr lang="en-US" dirty="0"/>
-              <a:t>5/2/2016</a:t>
+              <a:t>5/3/2016</a:t>
             </a:fld>
             <a:endParaRPr lang="en-US" dirty="0"/>
           </a:p>
@@ -4507,7 +4513,7 @@
           <a:p>
             <a:fld id="{4509A250-FF31-4206-8172-F9D3106AACB1}" type="datetimeFigureOut">
               <a:rPr lang="en-US" dirty="0"/>
-              <a:t>5/2/2016</a:t>
+              <a:t>5/3/2016</a:t>
             </a:fld>
             <a:endParaRPr lang="en-US" dirty="0"/>
           </a:p>
@@ -4781,7 +4787,7 @@
           <a:p>
             <a:fld id="{4509A250-FF31-4206-8172-F9D3106AACB1}" type="datetimeFigureOut">
               <a:rPr lang="en-US" dirty="0"/>
-              <a:t>5/2/2016</a:t>
+              <a:t>5/3/2016</a:t>
             </a:fld>
             <a:endParaRPr lang="en-US" dirty="0"/>
           </a:p>
@@ -5051,7 +5057,7 @@
           <a:p>
             <a:fld id="{4509A250-FF31-4206-8172-F9D3106AACB1}" type="datetimeFigureOut">
               <a:rPr lang="en-US" dirty="0"/>
-              <a:t>5/2/2016</a:t>
+              <a:t>5/3/2016</a:t>
             </a:fld>
             <a:endParaRPr lang="en-US" dirty="0"/>
           </a:p>
@@ -5475,7 +5481,7 @@
           <a:p>
             <a:fld id="{4AAD347D-5ACD-4C99-B74B-A9C85AD731AF}" type="datetimeFigureOut">
               <a:rPr lang="en-US" dirty="0"/>
-              <a:t>5/2/2016</a:t>
+              <a:t>5/3/2016</a:t>
             </a:fld>
             <a:endParaRPr lang="en-US" dirty="0"/>
           </a:p>
@@ -6341,6 +6347,220 @@
 </p:sld>
 </file>
 
+<file path=ppt/slides/slide4.xml><?xml version="1.0" encoding="utf-8"?>
+<p:sld xmlns:a="http://schemas.openxmlformats.org/drawingml/2006/main" xmlns:r="http://schemas.openxmlformats.org/officeDocument/2006/relationships" xmlns:p="http://schemas.openxmlformats.org/presentationml/2006/main">
+  <p:cSld>
+    <p:spTree>
+      <p:nvGrpSpPr>
+        <p:cNvPr id="1" name=""/>
+        <p:cNvGrpSpPr/>
+        <p:nvPr/>
+      </p:nvGrpSpPr>
+      <p:grpSpPr>
+        <a:xfrm>
+          <a:off x="0" y="0"/>
+          <a:ext cx="0" cy="0"/>
+          <a:chOff x="0" y="0"/>
+          <a:chExt cx="0" cy="0"/>
+        </a:xfrm>
+      </p:grpSpPr>
+      <p:sp>
+        <p:nvSpPr>
+          <p:cNvPr id="2" name="Title 1"/>
+          <p:cNvSpPr>
+            <a:spLocks noGrp="1"/>
+          </p:cNvSpPr>
+          <p:nvPr>
+            <p:ph type="title"/>
+          </p:nvPr>
+        </p:nvSpPr>
+        <p:spPr/>
+        <p:txBody>
+          <a:bodyPr/>
+          <a:lstStyle/>
+          <a:p>
+            <a:r>
+              <a:rPr lang="en-US" dirty="0" smtClean="0"/>
+              <a:t>Levels</a:t>
+            </a:r>
+            <a:endParaRPr lang="en-US" dirty="0"/>
+          </a:p>
+        </p:txBody>
+      </p:sp>
+      <p:sp>
+        <p:nvSpPr>
+          <p:cNvPr id="3" name="Content Placeholder 2"/>
+          <p:cNvSpPr>
+            <a:spLocks noGrp="1"/>
+          </p:cNvSpPr>
+          <p:nvPr>
+            <p:ph idx="1"/>
+          </p:nvPr>
+        </p:nvSpPr>
+        <p:spPr/>
+        <p:txBody>
+          <a:bodyPr/>
+          <a:lstStyle/>
+          <a:p>
+            <a:r>
+              <a:rPr lang="en-US" dirty="0" smtClean="0"/>
+              <a:t>All enemies defeated </a:t>
+            </a:r>
+            <a:r>
+              <a:rPr lang="en-US" dirty="0" smtClean="0">
+                <a:sym typeface="Wingdings" panose="05000000000000000000" pitchFamily="2" charset="2"/>
+              </a:rPr>
+              <a:t> advance to next level</a:t>
+            </a:r>
+            <a:endParaRPr lang="en-US" dirty="0" smtClean="0"/>
+          </a:p>
+          <a:p>
+            <a:r>
+              <a:rPr lang="en-US" dirty="0" smtClean="0"/>
+              <a:t>Enemies become faster</a:t>
+            </a:r>
+          </a:p>
+          <a:p>
+            <a:r>
+              <a:rPr lang="en-US" dirty="0" smtClean="0"/>
+              <a:t>Enemy sprites change on certain levels</a:t>
+            </a:r>
+          </a:p>
+        </p:txBody>
+      </p:sp>
+      <p:pic>
+        <p:nvPicPr>
+          <p:cNvPr id="4" name="Picture 3"/>
+          <p:cNvPicPr>
+            <a:picLocks noChangeAspect="1"/>
+          </p:cNvPicPr>
+          <p:nvPr/>
+        </p:nvPicPr>
+        <p:blipFill>
+          <a:blip r:embed="rId2">
+            <a:extLst>
+              <a:ext uri="{28A0092B-C50C-407E-A947-70E740481C1C}">
+                <a14:useLocalDpi xmlns:a14="http://schemas.microsoft.com/office/drawing/2010/main" val="0"/>
+              </a:ext>
+            </a:extLst>
+          </a:blip>
+          <a:stretch>
+            <a:fillRect/>
+          </a:stretch>
+        </p:blipFill>
+        <p:spPr>
+          <a:xfrm>
+            <a:off x="9041800" y="3867833"/>
+            <a:ext cx="2016106" cy="2016106"/>
+          </a:xfrm>
+          <a:prstGeom prst="rect">
+            <a:avLst/>
+          </a:prstGeom>
+        </p:spPr>
+      </p:pic>
+      <p:pic>
+        <p:nvPicPr>
+          <p:cNvPr id="5" name="Picture 4"/>
+          <p:cNvPicPr>
+            <a:picLocks noChangeAspect="1"/>
+          </p:cNvPicPr>
+          <p:nvPr/>
+        </p:nvPicPr>
+        <p:blipFill>
+          <a:blip r:embed="rId3">
+            <a:extLst>
+              <a:ext uri="{28A0092B-C50C-407E-A947-70E740481C1C}">
+                <a14:useLocalDpi xmlns:a14="http://schemas.microsoft.com/office/drawing/2010/main" val="0"/>
+              </a:ext>
+            </a:extLst>
+          </a:blip>
+          <a:stretch>
+            <a:fillRect/>
+          </a:stretch>
+        </p:blipFill>
+        <p:spPr>
+          <a:xfrm>
+            <a:off x="6217354" y="3740650"/>
+            <a:ext cx="2270472" cy="2270472"/>
+          </a:xfrm>
+          <a:prstGeom prst="rect">
+            <a:avLst/>
+          </a:prstGeom>
+        </p:spPr>
+      </p:pic>
+      <p:pic>
+        <p:nvPicPr>
+          <p:cNvPr id="6" name="Picture 5"/>
+          <p:cNvPicPr>
+            <a:picLocks noChangeAspect="1"/>
+          </p:cNvPicPr>
+          <p:nvPr/>
+        </p:nvPicPr>
+        <p:blipFill>
+          <a:blip r:embed="rId4">
+            <a:extLst>
+              <a:ext uri="{28A0092B-C50C-407E-A947-70E740481C1C}">
+                <a14:useLocalDpi xmlns:a14="http://schemas.microsoft.com/office/drawing/2010/main" val="0"/>
+              </a:ext>
+            </a:extLst>
+          </a:blip>
+          <a:stretch>
+            <a:fillRect/>
+          </a:stretch>
+        </p:blipFill>
+        <p:spPr>
+          <a:xfrm>
+            <a:off x="3601172" y="3867833"/>
+            <a:ext cx="2139470" cy="2139470"/>
+          </a:xfrm>
+          <a:prstGeom prst="rect">
+            <a:avLst/>
+          </a:prstGeom>
+        </p:spPr>
+      </p:pic>
+      <p:pic>
+        <p:nvPicPr>
+          <p:cNvPr id="7" name="Picture 6"/>
+          <p:cNvPicPr>
+            <a:picLocks noChangeAspect="1"/>
+          </p:cNvPicPr>
+          <p:nvPr/>
+        </p:nvPicPr>
+        <p:blipFill>
+          <a:blip r:embed="rId5">
+            <a:extLst>
+              <a:ext uri="{28A0092B-C50C-407E-A947-70E740481C1C}">
+                <a14:useLocalDpi xmlns:a14="http://schemas.microsoft.com/office/drawing/2010/main" val="0"/>
+              </a:ext>
+            </a:extLst>
+          </a:blip>
+          <a:stretch>
+            <a:fillRect/>
+          </a:stretch>
+        </p:blipFill>
+        <p:spPr>
+          <a:xfrm>
+            <a:off x="852240" y="3801458"/>
+            <a:ext cx="2272220" cy="2272220"/>
+          </a:xfrm>
+          <a:prstGeom prst="rect">
+            <a:avLst/>
+          </a:prstGeom>
+        </p:spPr>
+      </p:pic>
+    </p:spTree>
+    <p:extLst>
+      <p:ext uri="{BB962C8B-B14F-4D97-AF65-F5344CB8AC3E}">
+        <p14:creationId xmlns:p14="http://schemas.microsoft.com/office/powerpoint/2010/main" val="1218973243"/>
+      </p:ext>
+    </p:extLst>
+  </p:cSld>
+  <p:clrMapOvr>
+    <a:masterClrMapping/>
+  </p:clrMapOvr>
+</p:sld>
+</file>
+
 <file path=ppt/theme/theme1.xml><?xml version="1.0" encoding="utf-8"?>
 <a:theme xmlns:a="http://schemas.openxmlformats.org/drawingml/2006/main" name="Ion">
   <a:themeElements>

</xml_diff>

<commit_message>
Added James Torres' stuff to the power point. Made some little changes to the game.
</commit_message>
<xml_diff>
--- a/Presentation/CSE 471 Project 3.pptx
+++ b/Presentation/CSE 471 Project 3.pptx
@@ -9,6 +9,8 @@
     <p:sldId id="257" r:id="rId3"/>
     <p:sldId id="258" r:id="rId4"/>
     <p:sldId id="259" r:id="rId5"/>
+    <p:sldId id="260" r:id="rId6"/>
+    <p:sldId id="261" r:id="rId7"/>
   </p:sldIdLst>
   <p:sldSz cx="12192000" cy="6858000"/>
   <p:notesSz cx="6858000" cy="9144000"/>
@@ -6082,6 +6084,13 @@
   <p:clrMapOvr>
     <a:masterClrMapping/>
   </p:clrMapOvr>
+  <p:timing>
+    <p:tnLst>
+      <p:par>
+        <p:cTn id="1" dur="indefinite" restart="never" nodeType="tmRoot"/>
+      </p:par>
+    </p:tnLst>
+  </p:timing>
 </p:sld>
 </file>
 
@@ -6232,6 +6241,13 @@
   <p:clrMapOvr>
     <a:masterClrMapping/>
   </p:clrMapOvr>
+  <p:timing>
+    <p:tnLst>
+      <p:par>
+        <p:cTn id="1" dur="indefinite" restart="never" nodeType="tmRoot"/>
+      </p:par>
+    </p:tnLst>
+  </p:timing>
 </p:sld>
 </file>
 
@@ -6344,6 +6360,13 @@
   <p:clrMapOvr>
     <a:masterClrMapping/>
   </p:clrMapOvr>
+  <p:timing>
+    <p:tnLst>
+      <p:par>
+        <p:cTn id="1" dur="indefinite" restart="never" nodeType="tmRoot"/>
+      </p:par>
+    </p:tnLst>
+  </p:timing>
 </p:sld>
 </file>
 
@@ -6423,8 +6446,19 @@
           <a:p>
             <a:r>
               <a:rPr lang="en-US" dirty="0" smtClean="0"/>
-              <a:t>Enemy sprites change on certain levels</a:t>
-            </a:r>
+              <a:t>Enemy sprites change on certain </a:t>
+            </a:r>
+            <a:r>
+              <a:rPr lang="en-US" dirty="0" smtClean="0"/>
+              <a:t>levels</a:t>
+            </a:r>
+          </a:p>
+          <a:p>
+            <a:r>
+              <a:rPr lang="en-US" dirty="0" smtClean="0"/>
+              <a:t>Enemies begin to shoot faster</a:t>
+            </a:r>
+            <a:endParaRPr lang="en-US" dirty="0" smtClean="0"/>
           </a:p>
         </p:txBody>
       </p:sp>
@@ -6558,6 +6592,403 @@
   <p:clrMapOvr>
     <a:masterClrMapping/>
   </p:clrMapOvr>
+  <p:timing>
+    <p:tnLst>
+      <p:par>
+        <p:cTn id="1" dur="indefinite" restart="never" nodeType="tmRoot"/>
+      </p:par>
+    </p:tnLst>
+  </p:timing>
+</p:sld>
+</file>
+
+<file path=ppt/slides/slide5.xml><?xml version="1.0" encoding="utf-8"?>
+<p:sld xmlns:a="http://schemas.openxmlformats.org/drawingml/2006/main" xmlns:r="http://schemas.openxmlformats.org/officeDocument/2006/relationships" xmlns:p="http://schemas.openxmlformats.org/presentationml/2006/main">
+  <p:cSld>
+    <p:spTree>
+      <p:nvGrpSpPr>
+        <p:cNvPr id="1" name=""/>
+        <p:cNvGrpSpPr/>
+        <p:nvPr/>
+      </p:nvGrpSpPr>
+      <p:grpSpPr>
+        <a:xfrm>
+          <a:off x="0" y="0"/>
+          <a:ext cx="0" cy="0"/>
+          <a:chOff x="0" y="0"/>
+          <a:chExt cx="0" cy="0"/>
+        </a:xfrm>
+      </p:grpSpPr>
+      <p:sp>
+        <p:nvSpPr>
+          <p:cNvPr id="2" name="Title 1"/>
+          <p:cNvSpPr>
+            <a:spLocks noGrp="1"/>
+          </p:cNvSpPr>
+          <p:nvPr>
+            <p:ph type="title"/>
+          </p:nvPr>
+        </p:nvSpPr>
+        <p:spPr/>
+        <p:txBody>
+          <a:bodyPr/>
+          <a:lstStyle/>
+          <a:p>
+            <a:r>
+              <a:rPr lang="en-US" dirty="0" smtClean="0"/>
+              <a:t>Rockets</a:t>
+            </a:r>
+            <a:endParaRPr lang="en-US" dirty="0"/>
+          </a:p>
+        </p:txBody>
+      </p:sp>
+      <p:sp>
+        <p:nvSpPr>
+          <p:cNvPr id="3" name="Content Placeholder 2"/>
+          <p:cNvSpPr>
+            <a:spLocks noGrp="1"/>
+          </p:cNvSpPr>
+          <p:nvPr>
+            <p:ph idx="1"/>
+          </p:nvPr>
+        </p:nvSpPr>
+        <p:spPr/>
+        <p:txBody>
+          <a:bodyPr/>
+          <a:lstStyle/>
+          <a:p>
+            <a:r>
+              <a:rPr lang="en-US" dirty="0" smtClean="0"/>
+              <a:t>Enemy rockets are slower then ship rockets</a:t>
+            </a:r>
+            <a:endParaRPr lang="en-US" dirty="0"/>
+          </a:p>
+          <a:p>
+            <a:r>
+              <a:rPr lang="en-US" dirty="0" smtClean="0"/>
+              <a:t>Only ship rockets can destroy enemy</a:t>
+            </a:r>
+          </a:p>
+          <a:p>
+            <a:r>
+              <a:rPr lang="en-US" dirty="0" smtClean="0"/>
+              <a:t>Ship has a limit to number of rockets allowed on a screen at a given time</a:t>
+            </a:r>
+          </a:p>
+          <a:p>
+            <a:pPr marL="0" indent="0">
+              <a:buNone/>
+            </a:pPr>
+            <a:endParaRPr lang="en-US" dirty="0" smtClean="0"/>
+          </a:p>
+        </p:txBody>
+      </p:sp>
+      <p:pic>
+        <p:nvPicPr>
+          <p:cNvPr id="5" name="Picture 4"/>
+          <p:cNvPicPr>
+            <a:picLocks noChangeAspect="1"/>
+          </p:cNvPicPr>
+          <p:nvPr/>
+        </p:nvPicPr>
+        <p:blipFill>
+          <a:blip r:embed="rId2">
+            <a:extLst>
+              <a:ext uri="{28A0092B-C50C-407E-A947-70E740481C1C}">
+                <a14:useLocalDpi xmlns:a14="http://schemas.microsoft.com/office/drawing/2010/main" val="0"/>
+              </a:ext>
+            </a:extLst>
+          </a:blip>
+          <a:stretch>
+            <a:fillRect/>
+          </a:stretch>
+        </p:blipFill>
+        <p:spPr>
+          <a:xfrm>
+            <a:off x="6088767" y="3301212"/>
+            <a:ext cx="2270472" cy="2270472"/>
+          </a:xfrm>
+          <a:prstGeom prst="rect">
+            <a:avLst/>
+          </a:prstGeom>
+        </p:spPr>
+      </p:pic>
+      <p:pic>
+        <p:nvPicPr>
+          <p:cNvPr id="6" name="Picture 5"/>
+          <p:cNvPicPr>
+            <a:picLocks noChangeAspect="1"/>
+          </p:cNvPicPr>
+          <p:nvPr/>
+        </p:nvPicPr>
+        <p:blipFill>
+          <a:blip r:embed="rId3">
+            <a:extLst>
+              <a:ext uri="{28A0092B-C50C-407E-A947-70E740481C1C}">
+                <a14:useLocalDpi xmlns:a14="http://schemas.microsoft.com/office/drawing/2010/main" val="0"/>
+              </a:ext>
+            </a:extLst>
+          </a:blip>
+          <a:stretch>
+            <a:fillRect/>
+          </a:stretch>
+        </p:blipFill>
+        <p:spPr>
+          <a:xfrm>
+            <a:off x="3601171" y="3366713"/>
+            <a:ext cx="2139470" cy="2139470"/>
+          </a:xfrm>
+          <a:prstGeom prst="rect">
+            <a:avLst/>
+          </a:prstGeom>
+        </p:spPr>
+      </p:pic>
+      <p:pic>
+        <p:nvPicPr>
+          <p:cNvPr id="8" name="Picture 7"/>
+          <p:cNvPicPr>
+            <a:picLocks noChangeAspect="1"/>
+          </p:cNvPicPr>
+          <p:nvPr/>
+        </p:nvPicPr>
+        <p:blipFill>
+          <a:blip r:embed="rId4">
+            <a:extLst>
+              <a:ext uri="{28A0092B-C50C-407E-A947-70E740481C1C}">
+                <a14:useLocalDpi xmlns:a14="http://schemas.microsoft.com/office/drawing/2010/main" val="0"/>
+              </a:ext>
+            </a:extLst>
+          </a:blip>
+          <a:stretch>
+            <a:fillRect/>
+          </a:stretch>
+        </p:blipFill>
+        <p:spPr>
+          <a:xfrm>
+            <a:off x="1945606" y="4530932"/>
+            <a:ext cx="813272" cy="813272"/>
+          </a:xfrm>
+          <a:prstGeom prst="rect">
+            <a:avLst/>
+          </a:prstGeom>
+        </p:spPr>
+      </p:pic>
+      <p:pic>
+        <p:nvPicPr>
+          <p:cNvPr id="9" name="Picture 8"/>
+          <p:cNvPicPr>
+            <a:picLocks noChangeAspect="1"/>
+          </p:cNvPicPr>
+          <p:nvPr/>
+        </p:nvPicPr>
+        <p:blipFill>
+          <a:blip r:embed="rId5">
+            <a:extLst>
+              <a:ext uri="{28A0092B-C50C-407E-A947-70E740481C1C}">
+                <a14:useLocalDpi xmlns:a14="http://schemas.microsoft.com/office/drawing/2010/main" val="0"/>
+              </a:ext>
+            </a:extLst>
+          </a:blip>
+          <a:stretch>
+            <a:fillRect/>
+          </a:stretch>
+        </p:blipFill>
+        <p:spPr>
+          <a:xfrm>
+            <a:off x="2285557" y="4150658"/>
+            <a:ext cx="133369" cy="285790"/>
+          </a:xfrm>
+          <a:prstGeom prst="rect">
+            <a:avLst/>
+          </a:prstGeom>
+        </p:spPr>
+      </p:pic>
+      <p:pic>
+        <p:nvPicPr>
+          <p:cNvPr id="10" name="Picture 9"/>
+          <p:cNvPicPr>
+            <a:picLocks noChangeAspect="1"/>
+          </p:cNvPicPr>
+          <p:nvPr/>
+        </p:nvPicPr>
+        <p:blipFill>
+          <a:blip r:embed="rId5">
+            <a:extLst>
+              <a:ext uri="{28A0092B-C50C-407E-A947-70E740481C1C}">
+                <a14:useLocalDpi xmlns:a14="http://schemas.microsoft.com/office/drawing/2010/main" val="0"/>
+              </a:ext>
+            </a:extLst>
+          </a:blip>
+          <a:stretch>
+            <a:fillRect/>
+          </a:stretch>
+        </p:blipFill>
+        <p:spPr>
+          <a:xfrm rot="10800000">
+            <a:off x="4563528" y="5058414"/>
+            <a:ext cx="133369" cy="285790"/>
+          </a:xfrm>
+          <a:prstGeom prst="rect">
+            <a:avLst/>
+          </a:prstGeom>
+        </p:spPr>
+      </p:pic>
+      <p:pic>
+        <p:nvPicPr>
+          <p:cNvPr id="11" name="Picture 10"/>
+          <p:cNvPicPr>
+            <a:picLocks noChangeAspect="1"/>
+          </p:cNvPicPr>
+          <p:nvPr/>
+        </p:nvPicPr>
+        <p:blipFill>
+          <a:blip r:embed="rId5">
+            <a:extLst>
+              <a:ext uri="{28A0092B-C50C-407E-A947-70E740481C1C}">
+                <a14:useLocalDpi xmlns:a14="http://schemas.microsoft.com/office/drawing/2010/main" val="0"/>
+              </a:ext>
+            </a:extLst>
+          </a:blip>
+          <a:stretch>
+            <a:fillRect/>
+          </a:stretch>
+        </p:blipFill>
+        <p:spPr>
+          <a:xfrm rot="10800000">
+            <a:off x="7090634" y="5135347"/>
+            <a:ext cx="133369" cy="285790"/>
+          </a:xfrm>
+          <a:prstGeom prst="rect">
+            <a:avLst/>
+          </a:prstGeom>
+        </p:spPr>
+      </p:pic>
+    </p:spTree>
+    <p:extLst>
+      <p:ext uri="{BB962C8B-B14F-4D97-AF65-F5344CB8AC3E}">
+        <p14:creationId xmlns:p14="http://schemas.microsoft.com/office/powerpoint/2010/main" val="477193336"/>
+      </p:ext>
+    </p:extLst>
+  </p:cSld>
+  <p:clrMapOvr>
+    <a:masterClrMapping/>
+  </p:clrMapOvr>
+  <p:timing>
+    <p:tnLst>
+      <p:par>
+        <p:cTn id="1" dur="indefinite" restart="never" nodeType="tmRoot"/>
+      </p:par>
+    </p:tnLst>
+  </p:timing>
+</p:sld>
+</file>
+
+<file path=ppt/slides/slide6.xml><?xml version="1.0" encoding="utf-8"?>
+<p:sld xmlns:a="http://schemas.openxmlformats.org/drawingml/2006/main" xmlns:r="http://schemas.openxmlformats.org/officeDocument/2006/relationships" xmlns:p="http://schemas.openxmlformats.org/presentationml/2006/main">
+  <p:cSld>
+    <p:spTree>
+      <p:nvGrpSpPr>
+        <p:cNvPr id="1" name=""/>
+        <p:cNvGrpSpPr/>
+        <p:nvPr/>
+      </p:nvGrpSpPr>
+      <p:grpSpPr>
+        <a:xfrm>
+          <a:off x="0" y="0"/>
+          <a:ext cx="0" cy="0"/>
+          <a:chOff x="0" y="0"/>
+          <a:chExt cx="0" cy="0"/>
+        </a:xfrm>
+      </p:grpSpPr>
+      <p:sp>
+        <p:nvSpPr>
+          <p:cNvPr id="2" name="Title 1"/>
+          <p:cNvSpPr>
+            <a:spLocks noGrp="1"/>
+          </p:cNvSpPr>
+          <p:nvPr>
+            <p:ph type="title"/>
+          </p:nvPr>
+        </p:nvSpPr>
+        <p:spPr/>
+        <p:txBody>
+          <a:bodyPr/>
+          <a:lstStyle/>
+          <a:p>
+            <a:r>
+              <a:rPr lang="en-US" dirty="0" smtClean="0"/>
+              <a:t>Game Over</a:t>
+            </a:r>
+            <a:endParaRPr lang="en-US" dirty="0"/>
+          </a:p>
+        </p:txBody>
+      </p:sp>
+      <p:sp>
+        <p:nvSpPr>
+          <p:cNvPr id="3" name="Content Placeholder 2"/>
+          <p:cNvSpPr>
+            <a:spLocks noGrp="1"/>
+          </p:cNvSpPr>
+          <p:nvPr>
+            <p:ph idx="1"/>
+          </p:nvPr>
+        </p:nvSpPr>
+        <p:spPr/>
+        <p:txBody>
+          <a:bodyPr/>
+          <a:lstStyle/>
+          <a:p>
+            <a:r>
+              <a:rPr lang="en-US" dirty="0" smtClean="0"/>
+              <a:t>Game over is determined on multiple factors</a:t>
+            </a:r>
+          </a:p>
+          <a:p>
+            <a:pPr lvl="1"/>
+            <a:r>
+              <a:rPr lang="en-US" dirty="0" smtClean="0"/>
+              <a:t>If the enemy missile overlaps with the ship</a:t>
+            </a:r>
+          </a:p>
+          <a:p>
+            <a:pPr lvl="1"/>
+            <a:r>
+              <a:rPr lang="en-US" dirty="0" smtClean="0"/>
+              <a:t>The ship overlaps a enemy</a:t>
+            </a:r>
+          </a:p>
+          <a:p>
+            <a:pPr lvl="1"/>
+            <a:r>
+              <a:rPr lang="en-US" dirty="0" smtClean="0"/>
+              <a:t>The enemy has reached a level equal to or below the ship</a:t>
+            </a:r>
+          </a:p>
+          <a:p>
+            <a:pPr marL="457200" lvl="1" indent="0">
+              <a:buNone/>
+            </a:pPr>
+            <a:endParaRPr lang="en-US" dirty="0"/>
+          </a:p>
+        </p:txBody>
+      </p:sp>
+    </p:spTree>
+    <p:extLst>
+      <p:ext uri="{BB962C8B-B14F-4D97-AF65-F5344CB8AC3E}">
+        <p14:creationId xmlns:p14="http://schemas.microsoft.com/office/powerpoint/2010/main" val="2260562457"/>
+      </p:ext>
+    </p:extLst>
+  </p:cSld>
+  <p:clrMapOvr>
+    <a:masterClrMapping/>
+  </p:clrMapOvr>
+  <p:timing>
+    <p:tnLst>
+      <p:par>
+        <p:cTn id="1" dur="indefinite" restart="never" nodeType="tmRoot"/>
+      </p:par>
+    </p:tnLst>
+  </p:timing>
 </p:sld>
 </file>
 

</xml_diff>